<commit_message>
edelleen muutettu  määrittelytiedostoja (2)
</commit_message>
<xml_diff>
--- a/kayttoliittyma.pptx
+++ b/kayttoliittyma.pptx
@@ -289,7 +289,7 @@
             <a:fld id="{E4673A47-3247-411C-9C2F-C8406D050DFB}" type="datetimeFigureOut">
               <a:rPr lang="fi-FI" smtClean="0"/>
               <a:pPr/>
-              <a:t>4.2.2014</a:t>
+              <a:t>5.2.2014</a:t>
             </a:fld>
             <a:endParaRPr lang="fi-FI"/>
           </a:p>
@@ -456,7 +456,7 @@
             <a:fld id="{E4673A47-3247-411C-9C2F-C8406D050DFB}" type="datetimeFigureOut">
               <a:rPr lang="fi-FI" smtClean="0"/>
               <a:pPr/>
-              <a:t>4.2.2014</a:t>
+              <a:t>5.2.2014</a:t>
             </a:fld>
             <a:endParaRPr lang="fi-FI"/>
           </a:p>
@@ -633,7 +633,7 @@
             <a:fld id="{E4673A47-3247-411C-9C2F-C8406D050DFB}" type="datetimeFigureOut">
               <a:rPr lang="fi-FI" smtClean="0"/>
               <a:pPr/>
-              <a:t>4.2.2014</a:t>
+              <a:t>5.2.2014</a:t>
             </a:fld>
             <a:endParaRPr lang="fi-FI"/>
           </a:p>
@@ -800,7 +800,7 @@
             <a:fld id="{E4673A47-3247-411C-9C2F-C8406D050DFB}" type="datetimeFigureOut">
               <a:rPr lang="fi-FI" smtClean="0"/>
               <a:pPr/>
-              <a:t>4.2.2014</a:t>
+              <a:t>5.2.2014</a:t>
             </a:fld>
             <a:endParaRPr lang="fi-FI"/>
           </a:p>
@@ -1043,7 +1043,7 @@
             <a:fld id="{E4673A47-3247-411C-9C2F-C8406D050DFB}" type="datetimeFigureOut">
               <a:rPr lang="fi-FI" smtClean="0"/>
               <a:pPr/>
-              <a:t>4.2.2014</a:t>
+              <a:t>5.2.2014</a:t>
             </a:fld>
             <a:endParaRPr lang="fi-FI"/>
           </a:p>
@@ -1328,7 +1328,7 @@
             <a:fld id="{E4673A47-3247-411C-9C2F-C8406D050DFB}" type="datetimeFigureOut">
               <a:rPr lang="fi-FI" smtClean="0"/>
               <a:pPr/>
-              <a:t>4.2.2014</a:t>
+              <a:t>5.2.2014</a:t>
             </a:fld>
             <a:endParaRPr lang="fi-FI"/>
           </a:p>
@@ -1747,7 +1747,7 @@
             <a:fld id="{E4673A47-3247-411C-9C2F-C8406D050DFB}" type="datetimeFigureOut">
               <a:rPr lang="fi-FI" smtClean="0"/>
               <a:pPr/>
-              <a:t>4.2.2014</a:t>
+              <a:t>5.2.2014</a:t>
             </a:fld>
             <a:endParaRPr lang="fi-FI"/>
           </a:p>
@@ -1862,7 +1862,7 @@
             <a:fld id="{E4673A47-3247-411C-9C2F-C8406D050DFB}" type="datetimeFigureOut">
               <a:rPr lang="fi-FI" smtClean="0"/>
               <a:pPr/>
-              <a:t>4.2.2014</a:t>
+              <a:t>5.2.2014</a:t>
             </a:fld>
             <a:endParaRPr lang="fi-FI"/>
           </a:p>
@@ -1954,7 +1954,7 @@
             <a:fld id="{E4673A47-3247-411C-9C2F-C8406D050DFB}" type="datetimeFigureOut">
               <a:rPr lang="fi-FI" smtClean="0"/>
               <a:pPr/>
-              <a:t>4.2.2014</a:t>
+              <a:t>5.2.2014</a:t>
             </a:fld>
             <a:endParaRPr lang="fi-FI"/>
           </a:p>
@@ -2228,7 +2228,7 @@
             <a:fld id="{E4673A47-3247-411C-9C2F-C8406D050DFB}" type="datetimeFigureOut">
               <a:rPr lang="fi-FI" smtClean="0"/>
               <a:pPr/>
-              <a:t>4.2.2014</a:t>
+              <a:t>5.2.2014</a:t>
             </a:fld>
             <a:endParaRPr lang="fi-FI"/>
           </a:p>
@@ -2478,7 +2478,7 @@
             <a:fld id="{E4673A47-3247-411C-9C2F-C8406D050DFB}" type="datetimeFigureOut">
               <a:rPr lang="fi-FI" smtClean="0"/>
               <a:pPr/>
-              <a:t>4.2.2014</a:t>
+              <a:t>5.2.2014</a:t>
             </a:fld>
             <a:endParaRPr lang="fi-FI"/>
           </a:p>
@@ -2688,7 +2688,7 @@
             <a:fld id="{E4673A47-3247-411C-9C2F-C8406D050DFB}" type="datetimeFigureOut">
               <a:rPr lang="fi-FI" smtClean="0"/>
               <a:pPr/>
-              <a:t>4.2.2014</a:t>
+              <a:t>5.2.2014</a:t>
             </a:fld>
             <a:endParaRPr lang="fi-FI"/>
           </a:p>
@@ -4182,6 +4182,118 @@
             <a:avLst>
               <a:gd name="adj1" fmla="val 1800000"/>
             </a:avLst>
+          </a:prstGeom>
+          <a:ln>
+            <a:tailEnd type="arrow"/>
+          </a:ln>
+        </p:spPr>
+        <p:style>
+          <a:lnRef idx="1">
+            <a:schemeClr val="accent1"/>
+          </a:lnRef>
+          <a:fillRef idx="0">
+            <a:schemeClr val="accent1"/>
+          </a:fillRef>
+          <a:effectRef idx="0">
+            <a:schemeClr val="accent1"/>
+          </a:effectRef>
+          <a:fontRef idx="minor">
+            <a:schemeClr val="tx1"/>
+          </a:fontRef>
+        </p:style>
+      </p:cxnSp>
+      <p:sp>
+        <p:nvSpPr>
+          <p:cNvPr id="39" name="Tekstikehys 38"/>
+          <p:cNvSpPr txBox="1"/>
+          <p:nvPr/>
+        </p:nvSpPr>
+        <p:spPr>
+          <a:xfrm>
+            <a:off x="3923928" y="5301208"/>
+            <a:ext cx="825034" cy="369332"/>
+          </a:xfrm>
+          <a:prstGeom prst="rect">
+            <a:avLst/>
+          </a:prstGeom>
+          <a:noFill/>
+          <a:ln>
+            <a:solidFill>
+              <a:schemeClr val="tx1"/>
+            </a:solidFill>
+          </a:ln>
+        </p:spPr>
+        <p:txBody>
+          <a:bodyPr wrap="none" rtlCol="0">
+            <a:spAutoFit/>
+          </a:bodyPr>
+          <a:lstStyle/>
+          <a:p>
+            <a:r>
+              <a:rPr lang="fi-FI" dirty="0" smtClean="0"/>
+              <a:t>Lopeta</a:t>
+            </a:r>
+            <a:endParaRPr lang="fi-FI" dirty="0"/>
+          </a:p>
+        </p:txBody>
+      </p:sp>
+      <p:sp>
+        <p:nvSpPr>
+          <p:cNvPr id="40" name="Ellipsi 39"/>
+          <p:cNvSpPr/>
+          <p:nvPr/>
+        </p:nvSpPr>
+        <p:spPr>
+          <a:xfrm>
+            <a:off x="5724128" y="5373216"/>
+            <a:ext cx="288032" cy="288032"/>
+          </a:xfrm>
+          <a:prstGeom prst="ellipse">
+            <a:avLst/>
+          </a:prstGeom>
+          <a:noFill/>
+        </p:spPr>
+        <p:style>
+          <a:lnRef idx="2">
+            <a:schemeClr val="accent1">
+              <a:shade val="50000"/>
+            </a:schemeClr>
+          </a:lnRef>
+          <a:fillRef idx="1">
+            <a:schemeClr val="accent1"/>
+          </a:fillRef>
+          <a:effectRef idx="0">
+            <a:schemeClr val="accent1"/>
+          </a:effectRef>
+          <a:fontRef idx="minor">
+            <a:schemeClr val="lt1"/>
+          </a:fontRef>
+        </p:style>
+        <p:txBody>
+          <a:bodyPr rtlCol="0" anchor="ctr"/>
+          <a:lstStyle/>
+          <a:p>
+            <a:pPr algn="ctr"/>
+            <a:endParaRPr lang="fi-FI"/>
+          </a:p>
+        </p:txBody>
+      </p:sp>
+      <p:cxnSp>
+        <p:nvCxnSpPr>
+          <p:cNvPr id="43" name="Suora nuoliyhdysviiva 42"/>
+          <p:cNvCxnSpPr>
+            <a:stCxn id="39" idx="3"/>
+            <a:endCxn id="40" idx="2"/>
+          </p:cNvCxnSpPr>
+          <p:nvPr/>
+        </p:nvCxnSpPr>
+        <p:spPr>
+          <a:xfrm>
+            <a:off x="4748962" y="5485874"/>
+            <a:ext cx="975166" cy="31358"/>
+          </a:xfrm>
+          <a:prstGeom prst="straightConnector1">
+            <a:avLst/>
           </a:prstGeom>
           <a:ln>
             <a:tailEnd type="arrow"/>

</xml_diff>